<commit_message>
vault backup: 2026-01-28 16:06:03
</commit_message>
<xml_diff>
--- a/de/ram/ref/SRAM PPA analysis_500MHz.pptx
+++ b/de/ram/ref/SRAM PPA analysis_500MHz.pptx
@@ -222,7 +222,7 @@
           <a:p>
             <a:fld id="{51B65BE0-96DB-4526-8B9E-46C326072A4F}" type="datetimeFigureOut">
               <a:rPr lang="zh-TW" altLang="en-US" smtClean="0"/>
-              <a:t>2026/1/19</a:t>
+              <a:t>2026/1/28</a:t>
             </a:fld>
             <a:endParaRPr lang="zh-TW" altLang="en-US"/>
           </a:p>
@@ -399,7 +399,7 @@
           <a:p>
             <a:fld id="{34EE9B56-F21D-4E22-AB47-1B2434A27BC3}" type="datetimeFigureOut">
               <a:rPr lang="zh-TW" altLang="en-US" smtClean="0"/>
-              <a:t>2026/1/19</a:t>
+              <a:t>2026/1/28</a:t>
             </a:fld>
             <a:endParaRPr lang="zh-TW" altLang="en-US"/>
           </a:p>
@@ -8074,14 +8074,14 @@
           <p:nvPr>
             <p:extLst>
               <p:ext uri="{D42A27DB-BD31-4B8C-83A1-F6EECF244321}">
-                <p14:modId xmlns:p14="http://schemas.microsoft.com/office/powerpoint/2010/main" val="3404921932"/>
+                <p14:modId xmlns:p14="http://schemas.microsoft.com/office/powerpoint/2010/main" val="2125061180"/>
               </p:ext>
             </p:extLst>
           </p:nvPr>
         </p:nvGraphicFramePr>
         <p:xfrm>
           <a:off x="328590" y="1095703"/>
-          <a:ext cx="11534819" cy="5486400"/>
+          <a:ext cx="11534819" cy="5221178"/>
         </p:xfrm>
         <a:graphic>
           <a:graphicData uri="http://schemas.openxmlformats.org/drawingml/2006/table">
@@ -9001,10 +9001,6 @@
                       </a:r>
                       <a:endParaRPr lang="zh-TW" altLang="en-US" dirty="0"/>
                     </a:p>
-                    <a:p>
-                      <a:pPr algn="ctr"/>
-                      <a:endParaRPr lang="zh-TW" altLang="en-US" dirty="0"/>
-                    </a:p>
                   </a:txBody>
                   <a:tcPr/>
                 </a:tc>
@@ -9154,7 +9150,7 @@
                         <a:buNone/>
                       </a:pPr>
                       <a:r>
-                        <a:rPr lang="en-US" altLang="zh-TW" sz="1800" b="0" i="0" u="none" strike="noStrike">
+                        <a:rPr lang="en-US" altLang="zh-TW" sz="1800" b="0" i="0" u="none" strike="noStrike" dirty="0">
                           <a:solidFill>
                             <a:srgbClr val="000000"/>
                           </a:solidFill>
@@ -9177,7 +9173,7 @@
                         <a:buNone/>
                       </a:pPr>
                       <a:r>
-                        <a:rPr lang="en-US" altLang="zh-TW" sz="1800" b="0" i="0" u="none" strike="noStrike">
+                        <a:rPr lang="en-US" altLang="zh-TW" sz="1800" b="0" i="0" u="none" strike="noStrike" dirty="0">
                           <a:solidFill>
                             <a:srgbClr val="000000"/>
                           </a:solidFill>
@@ -9223,7 +9219,7 @@
                         <a:buNone/>
                       </a:pPr>
                       <a:r>
-                        <a:rPr lang="en-US" altLang="zh-TW" sz="1800" b="0" i="0" u="none" strike="noStrike">
+                        <a:rPr lang="en-US" altLang="zh-TW" sz="1800" b="0" i="0" u="none" strike="noStrike" dirty="0">
                           <a:solidFill>
                             <a:srgbClr val="000000"/>
                           </a:solidFill>
@@ -9444,14 +9440,14 @@
           <p:nvPr>
             <p:extLst>
               <p:ext uri="{D42A27DB-BD31-4B8C-83A1-F6EECF244321}">
-                <p14:modId xmlns:p14="http://schemas.microsoft.com/office/powerpoint/2010/main" val="759303003"/>
+                <p14:modId xmlns:p14="http://schemas.microsoft.com/office/powerpoint/2010/main" val="1244527407"/>
               </p:ext>
             </p:extLst>
           </p:nvPr>
         </p:nvGraphicFramePr>
         <p:xfrm>
           <a:off x="328590" y="1095703"/>
-          <a:ext cx="11534819" cy="5486400"/>
+          <a:ext cx="11534819" cy="5221178"/>
         </p:xfrm>
         <a:graphic>
           <a:graphicData uri="http://schemas.openxmlformats.org/drawingml/2006/table">
@@ -10133,7 +10129,7 @@
                         <a:buNone/>
                       </a:pPr>
                       <a:r>
-                        <a:rPr lang="en-US" altLang="zh-TW" sz="1800" b="0" i="0" u="none" strike="noStrike">
+                        <a:rPr lang="en-US" altLang="zh-TW" sz="1800" b="0" i="0" u="none" strike="noStrike" dirty="0">
                           <a:solidFill>
                             <a:srgbClr val="000000"/>
                           </a:solidFill>
@@ -10371,10 +10367,6 @@
                       </a:r>
                       <a:endParaRPr lang="zh-TW" altLang="en-US" dirty="0"/>
                     </a:p>
-                    <a:p>
-                      <a:pPr algn="ctr"/>
-                      <a:endParaRPr lang="zh-TW" altLang="en-US" dirty="0"/>
-                    </a:p>
                   </a:txBody>
                   <a:tcPr/>
                 </a:tc>
@@ -10524,7 +10516,7 @@
                         <a:buNone/>
                       </a:pPr>
                       <a:r>
-                        <a:rPr lang="en-US" altLang="zh-TW" sz="1800" b="0" i="0" u="none" strike="noStrike">
+                        <a:rPr lang="en-US" altLang="zh-TW" sz="1800" b="0" i="0" u="none" strike="noStrike" dirty="0">
                           <a:solidFill>
                             <a:srgbClr val="000000"/>
                           </a:solidFill>
@@ -10570,7 +10562,7 @@
                         <a:buNone/>
                       </a:pPr>
                       <a:r>
-                        <a:rPr lang="en-US" altLang="zh-TW" sz="1800" b="0" i="0" u="none" strike="noStrike">
+                        <a:rPr lang="en-US" altLang="zh-TW" sz="1800" b="0" i="0" u="none" strike="noStrike" dirty="0">
                           <a:solidFill>
                             <a:srgbClr val="000000"/>
                           </a:solidFill>
@@ -10814,14 +10806,14 @@
           <p:nvPr>
             <p:extLst>
               <p:ext uri="{D42A27DB-BD31-4B8C-83A1-F6EECF244321}">
-                <p14:modId xmlns:p14="http://schemas.microsoft.com/office/powerpoint/2010/main" val="66638856"/>
+                <p14:modId xmlns:p14="http://schemas.microsoft.com/office/powerpoint/2010/main" val="1012636747"/>
               </p:ext>
             </p:extLst>
           </p:nvPr>
         </p:nvGraphicFramePr>
         <p:xfrm>
           <a:off x="328590" y="1095703"/>
-          <a:ext cx="11534819" cy="5486400"/>
+          <a:ext cx="11534819" cy="5221178"/>
         </p:xfrm>
         <a:graphic>
           <a:graphicData uri="http://schemas.openxmlformats.org/drawingml/2006/table">
@@ -11763,10 +11755,6 @@
                         <a:rPr lang="en-US" altLang="zh-TW" dirty="0"/>
                         <a:t>(other bank)</a:t>
                       </a:r>
-                      <a:endParaRPr lang="zh-TW" altLang="en-US" dirty="0"/>
-                    </a:p>
-                    <a:p>
-                      <a:pPr algn="ctr"/>
                       <a:endParaRPr lang="zh-TW" altLang="en-US" dirty="0"/>
                     </a:p>
                   </a:txBody>
@@ -12208,14 +12196,14 @@
           <p:nvPr>
             <p:extLst>
               <p:ext uri="{D42A27DB-BD31-4B8C-83A1-F6EECF244321}">
-                <p14:modId xmlns:p14="http://schemas.microsoft.com/office/powerpoint/2010/main" val="741196314"/>
+                <p14:modId xmlns:p14="http://schemas.microsoft.com/office/powerpoint/2010/main" val="2633091280"/>
               </p:ext>
             </p:extLst>
           </p:nvPr>
         </p:nvGraphicFramePr>
         <p:xfrm>
           <a:off x="328590" y="1095703"/>
-          <a:ext cx="11534819" cy="5486400"/>
+          <a:ext cx="11534819" cy="5221178"/>
         </p:xfrm>
         <a:graphic>
           <a:graphicData uri="http://schemas.openxmlformats.org/drawingml/2006/table">
@@ -13157,10 +13145,6 @@
                         <a:rPr lang="en-US" altLang="zh-TW" dirty="0"/>
                         <a:t>(other bank)</a:t>
                       </a:r>
-                      <a:endParaRPr lang="zh-TW" altLang="en-US" dirty="0"/>
-                    </a:p>
-                    <a:p>
-                      <a:pPr algn="ctr"/>
                       <a:endParaRPr lang="zh-TW" altLang="en-US" dirty="0"/>
                     </a:p>
                   </a:txBody>

</xml_diff>